<commit_message>
Version final du Froum PHP
</commit_message>
<xml_diff>
--- a/Forum_V4/Forum.pptx
+++ b/Forum_V4/Forum.pptx
@@ -15121,7 +15121,7 @@
                 </a:solidFill>
                 <a:latin typeface="Calibri"/>
               </a:rPr>
-              <a:t>19/01/2015</a:t>
+              <a:t>20/01/2015</a:t>
             </a:r>
             <a:endParaRPr/>
           </a:p>
@@ -15180,7 +15180,7 @@
                 <a:spcPct val="100000"/>
               </a:lnSpc>
             </a:pPr>
-            <a:fld id="{8E88342F-F374-483E-9536-8202C68BFAD1}" type="slidenum">
+            <a:fld id="{9AB918FB-27DA-4D11-A8E7-0F09602C2789}" type="slidenum">
               <a:rPr lang="fr-FR" sz="1200" strike="noStrike">
                 <a:solidFill>
                   <a:srgbClr val="898989"/>
@@ -15378,7 +15378,7 @@
                 </a:solidFill>
                 <a:latin typeface="Calibri"/>
               </a:rPr>
-              <a:t>19/01/2015</a:t>
+              <a:t>20/01/2015</a:t>
             </a:r>
             <a:endParaRPr/>
           </a:p>
@@ -15437,7 +15437,7 @@
                 <a:spcPct val="100000"/>
               </a:lnSpc>
             </a:pPr>
-            <a:fld id="{3AD8F505-339A-4412-884A-B2083A0A8466}" type="slidenum">
+            <a:fld id="{B15933EC-DE7D-4DEF-A2FE-F53E86DAA1B7}" type="slidenum">
               <a:rPr lang="fr-FR" sz="1200" strike="noStrike">
                 <a:solidFill>
                   <a:srgbClr val="898989"/>
@@ -15686,7 +15686,7 @@
                 </a:solidFill>
                 <a:latin typeface="Calibri"/>
               </a:rPr>
-              <a:t>19/01/2015</a:t>
+              <a:t>20/01/2015</a:t>
             </a:r>
             <a:endParaRPr/>
           </a:p>
@@ -15745,7 +15745,7 @@
                 <a:spcPct val="100000"/>
               </a:lnSpc>
             </a:pPr>
-            <a:fld id="{D665FE45-A94A-423B-ACE0-A9D8A279DB56}" type="slidenum">
+            <a:fld id="{ED4EBED5-0C52-493B-B315-E84B75ED78BA}" type="slidenum">
               <a:rPr lang="fr-FR" sz="1200" strike="noStrike">
                 <a:solidFill>
                   <a:srgbClr val="898989"/>
@@ -15994,7 +15994,7 @@
                 </a:solidFill>
                 <a:latin typeface="Calibri"/>
               </a:rPr>
-              <a:t>19/01/2015</a:t>
+              <a:t>20/01/2015</a:t>
             </a:r>
             <a:endParaRPr/>
           </a:p>
@@ -16053,7 +16053,7 @@
                 <a:spcPct val="100000"/>
               </a:lnSpc>
             </a:pPr>
-            <a:fld id="{477FC6EA-2EFC-4509-9F3E-4E61B61F119A}" type="slidenum">
+            <a:fld id="{FCF4B885-A60C-48D7-9741-A9CED0FF7B0E}" type="slidenum">
               <a:rPr lang="fr-FR" sz="1200" strike="noStrike">
                 <a:solidFill>
                   <a:srgbClr val="898989"/>
@@ -16115,7 +16115,7 @@
         </p:blipFill>
         <p:spPr>
           <a:xfrm>
-            <a:off x="0" y="97920"/>
+            <a:off x="-52560" y="97920"/>
             <a:ext cx="7070760" cy="1458360"/>
           </a:xfrm>
           <a:prstGeom prst="rect">
@@ -16367,7 +16367,7 @@
           <a:bodyPr lIns="0" rIns="0" tIns="0" bIns="0"/>
           <a:p>
             <a:pPr algn="r"/>
-            <a:fld id="{E57A2A99-42FC-440F-A2A7-DD8F4892C9B3}" type="slidenum">
+            <a:fld id="{F3475FC6-9812-4F32-8267-A1441F3C276F}" type="slidenum">
               <a:rPr lang="fr-FR" sz="1400">
                 <a:latin typeface="Times New Roman"/>
               </a:rPr>
@@ -16535,7 +16535,7 @@
                 </a:solidFill>
                 <a:latin typeface="Calibri"/>
               </a:rPr>
-              <a:t>19/01/2015</a:t>
+              <a:t>20/01/2015</a:t>
             </a:r>
             <a:endParaRPr/>
           </a:p>
@@ -16594,7 +16594,7 @@
                 <a:spcPct val="100000"/>
               </a:lnSpc>
             </a:pPr>
-            <a:fld id="{09A9DCD1-8874-4CBD-9A24-4326018EB40E}" type="slidenum">
+            <a:fld id="{2303322E-A507-44B3-9CA0-0AA34F7DB078}" type="slidenum">
               <a:rPr lang="fr-FR" sz="1200" strike="noStrike">
                 <a:solidFill>
                   <a:srgbClr val="898989"/>
@@ -16964,7 +16964,7 @@
                 </a:solidFill>
                 <a:latin typeface="Calibri"/>
               </a:rPr>
-              <a:t>19/01/2015</a:t>
+              <a:t>20/01/2015</a:t>
             </a:r>
             <a:endParaRPr/>
           </a:p>
@@ -17023,7 +17023,7 @@
                 <a:spcPct val="100000"/>
               </a:lnSpc>
             </a:pPr>
-            <a:fld id="{4D417DA2-910F-4FEB-AB35-A5F3042E6DDB}" type="slidenum">
+            <a:fld id="{048F8F0E-0457-444B-89B9-6F8BEAD93B6D}" type="slidenum">
               <a:rPr lang="fr-FR" sz="1200" strike="noStrike">
                 <a:solidFill>
                   <a:srgbClr val="898989"/>
@@ -17315,7 +17315,7 @@
                 </a:solidFill>
                 <a:latin typeface="Calibri"/>
               </a:rPr>
-              <a:t>19/01/2015</a:t>
+              <a:t>20/01/2015</a:t>
             </a:r>
             <a:endParaRPr/>
           </a:p>
@@ -17374,7 +17374,7 @@
                 <a:spcPct val="100000"/>
               </a:lnSpc>
             </a:pPr>
-            <a:fld id="{28FDD6A4-C9D0-4A86-BFD9-17EF855CD639}" type="slidenum">
+            <a:fld id="{030A8699-FEDB-45C5-BE69-7096964959AD}" type="slidenum">
               <a:rPr lang="fr-FR" sz="1200" strike="noStrike">
                 <a:solidFill>
                   <a:srgbClr val="898989"/>
@@ -17741,7 +17741,7 @@
                 </a:solidFill>
                 <a:latin typeface="Calibri"/>
               </a:rPr>
-              <a:t>19/01/2015</a:t>
+              <a:t>20/01/2015</a:t>
             </a:r>
             <a:endParaRPr/>
           </a:p>
@@ -17800,7 +17800,7 @@
                 <a:spcPct val="100000"/>
               </a:lnSpc>
             </a:pPr>
-            <a:fld id="{B1C2B8EA-A8E1-4FAE-9CCB-ACC513CDB04C}" type="slidenum">
+            <a:fld id="{2155BA81-0FBB-4786-A5B2-87B61AF47ABF}" type="slidenum">
               <a:rPr lang="fr-FR" sz="1200" strike="noStrike">
                 <a:solidFill>
                   <a:srgbClr val="898989"/>
@@ -18247,7 +18247,7 @@
                 </a:solidFill>
                 <a:latin typeface="Calibri"/>
               </a:rPr>
-              <a:t>19/01/2015</a:t>
+              <a:t>20/01/2015</a:t>
             </a:r>
             <a:endParaRPr/>
           </a:p>
@@ -18306,7 +18306,7 @@
                 <a:spcPct val="100000"/>
               </a:lnSpc>
             </a:pPr>
-            <a:fld id="{75CE1DAE-A898-4839-9048-6ECF23ECD800}" type="slidenum">
+            <a:fld id="{F8835CEC-38D0-4968-B921-77DB76CA727B}" type="slidenum">
               <a:rPr lang="fr-FR" sz="1200" strike="noStrike">
                 <a:solidFill>
                   <a:srgbClr val="898989"/>
@@ -18437,7 +18437,7 @@
                 </a:solidFill>
                 <a:latin typeface="Calibri"/>
               </a:rPr>
-              <a:t>19/01/2015</a:t>
+              <a:t>20/01/2015</a:t>
             </a:r>
             <a:endParaRPr/>
           </a:p>
@@ -18496,7 +18496,7 @@
                 <a:spcPct val="100000"/>
               </a:lnSpc>
             </a:pPr>
-            <a:fld id="{B0A9214D-560C-48CA-A36C-85CAB24D629F}" type="slidenum">
+            <a:fld id="{7D17B70C-D5B4-476B-BD0A-61B1AFFFFD10}" type="slidenum">
               <a:rPr lang="fr-FR" sz="1200" strike="noStrike">
                 <a:solidFill>
                   <a:srgbClr val="898989"/>
@@ -18587,7 +18587,7 @@
                 </a:solidFill>
                 <a:latin typeface="Calibri"/>
               </a:rPr>
-              <a:t>19/01/2015</a:t>
+              <a:t>20/01/2015</a:t>
             </a:r>
             <a:endParaRPr/>
           </a:p>
@@ -18646,7 +18646,7 @@
                 <a:spcPct val="100000"/>
               </a:lnSpc>
             </a:pPr>
-            <a:fld id="{A08577FA-AE0C-4E49-85E9-E8CAA2B9C65D}" type="slidenum">
+            <a:fld id="{5E7497BA-DCB0-430F-96C0-DE967556637D}" type="slidenum">
               <a:rPr lang="fr-FR" sz="1200" strike="noStrike">
                 <a:solidFill>
                   <a:srgbClr val="898989"/>
@@ -18935,7 +18935,7 @@
                 </a:solidFill>
                 <a:latin typeface="Calibri"/>
               </a:rPr>
-              <a:t>19/01/2015</a:t>
+              <a:t>20/01/2015</a:t>
             </a:r>
             <a:endParaRPr/>
           </a:p>
@@ -18994,7 +18994,7 @@
                 <a:spcPct val="100000"/>
               </a:lnSpc>
             </a:pPr>
-            <a:fld id="{0D2BC5D9-3142-45F0-A428-F28DB2E1DF8D}" type="slidenum">
+            <a:fld id="{3D38C5B0-96F8-4980-9201-DF7ED67B1773}" type="slidenum">
               <a:rPr lang="fr-FR" sz="1200" strike="noStrike">
                 <a:solidFill>
                   <a:srgbClr val="898989"/>
@@ -19110,7 +19110,7 @@
               <a:rPr lang="fr-FR" sz="2400">
                 <a:latin typeface="Arial"/>
               </a:rPr>
-              <a:t>Alexandre Bouzat, William Decool, Mehdi El Mouhadabe</a:t>
+              <a:t>Alexandre Bouzat, William Decool, Mehdi El Mouaddabe</a:t>
             </a:r>
             <a:endParaRPr/>
           </a:p>
@@ -19222,7 +19222,7 @@
               <a:rPr lang="fr-FR">
                 <a:latin typeface="Arial"/>
               </a:rPr>
-              <a:t>Licence Professionnelle Réseau Et Télécommunication</a:t>
+              <a:t>Licence Professionnelle Réseaux Et Télécommunications</a:t>
             </a:r>
             <a:endParaRPr/>
           </a:p>
@@ -19230,6 +19230,33 @@
       </p:sp>
     </p:spTree>
   </p:cSld>
+  <p:timing>
+    <p:tnLst>
+      <p:par>
+        <p:cTn id="1" dur="indefinite" restart="never" nodeType="tmRoot">
+          <p:childTnLst>
+            <p:seq>
+              <p:cTn id="2" nodeType="mainSeq"/>
+              <p:prevCondLst>
+                <p:cond delay="0" evt="onPrev">
+                  <p:tgtEl>
+                    <p:sldTgt/>
+                  </p:tgtEl>
+                </p:cond>
+              </p:prevCondLst>
+              <p:nextCondLst>
+                <p:cond delay="0" evt="onNext">
+                  <p:tgtEl>
+                    <p:sldTgt/>
+                  </p:tgtEl>
+                </p:cond>
+              </p:nextCondLst>
+            </p:seq>
+          </p:childTnLst>
+        </p:cTn>
+      </p:par>
+    </p:tnLst>
+  </p:timing>
 </p:sld>
 </file>
 
@@ -19298,8 +19325,8 @@
         </p:nvSpPr>
         <p:spPr>
           <a:xfrm>
-            <a:off x="457200" y="1654560"/>
-            <a:ext cx="4015800" cy="1896840"/>
+            <a:off x="864720" y="2698560"/>
+            <a:ext cx="8279280" cy="1896840"/>
           </a:xfrm>
           <a:prstGeom prst="rect">
             <a:avLst/>
@@ -19367,6 +19394,16 @@
               <a:buFont typeface="Arial"/>
               <a:buChar char="•"/>
             </a:pPr>
+            <a:endParaRPr/>
+          </a:p>
+          <a:p>
+            <a:pPr>
+              <a:lnSpc>
+                <a:spcPct val="100000"/>
+              </a:lnSpc>
+              <a:buFont typeface="Arial"/>
+              <a:buChar char="•"/>
+            </a:pPr>
             <a:r>
               <a:rPr lang="fr-FR" sz="3200" strike="noStrike">
                 <a:solidFill>
@@ -19374,7 +19411,7 @@
                 </a:solidFill>
                 <a:latin typeface="Calibri"/>
               </a:rPr>
-              <a:t>Le site : </a:t>
+              <a:t>Site : </a:t>
             </a:r>
             <a:r>
               <a:rPr lang="fr-FR" sz="3200" strike="noStrike">
@@ -19427,16 +19464,6 @@
             </a:pPr>
             <a:endParaRPr/>
           </a:p>
-          <a:p>
-            <a:pPr>
-              <a:lnSpc>
-                <a:spcPct val="100000"/>
-              </a:lnSpc>
-              <a:buFont typeface="Arial"/>
-              <a:buChar char="•"/>
-            </a:pPr>
-            <a:endParaRPr/>
-          </a:p>
         </p:txBody>
       </p:sp>
     </p:spTree>
@@ -19444,10 +19471,10 @@
   <p:timing>
     <p:tnLst>
       <p:par>
-        <p:cTn id="7" dur="indefinite" restart="never" nodeType="tmRoot">
+        <p:cTn id="19" dur="indefinite" restart="never" nodeType="tmRoot">
           <p:childTnLst>
             <p:seq>
-              <p:cTn id="8" nodeType="mainSeq"/>
+              <p:cTn id="20" nodeType="mainSeq"/>
               <p:prevCondLst>
                 <p:cond delay="0" evt="onPrev">
                   <p:tgtEl>
@@ -19536,8 +19563,8 @@
         </p:nvSpPr>
         <p:spPr>
           <a:xfrm>
-            <a:off x="457200" y="1654560"/>
-            <a:ext cx="4015800" cy="1896840"/>
+            <a:off x="1367280" y="1833840"/>
+            <a:ext cx="5344560" cy="4060440"/>
           </a:xfrm>
           <a:prstGeom prst="rect">
             <a:avLst/>
@@ -19562,8 +19589,16 @@
                 </a:solidFill>
                 <a:latin typeface="Calibri"/>
               </a:rPr>
-              <a:t>Sujet :  </a:t>
+              <a:t>Projet de groupe</a:t>
             </a:r>
+            <a:endParaRPr/>
+          </a:p>
+          <a:p>
+            <a:pPr>
+              <a:lnSpc>
+                <a:spcPct val="100000"/>
+              </a:lnSpc>
+            </a:pPr>
             <a:endParaRPr/>
           </a:p>
           <a:p>
@@ -19579,8 +19614,16 @@
                 </a:solidFill>
                 <a:latin typeface="Calibri"/>
               </a:rPr>
-              <a:t>Forum PHP</a:t>
+              <a:t>Entraînement de projet tuteuré/stage/apprentissage</a:t>
             </a:r>
+            <a:endParaRPr/>
+          </a:p>
+          <a:p>
+            <a:pPr>
+              <a:lnSpc>
+                <a:spcPct val="100000"/>
+              </a:lnSpc>
+            </a:pPr>
             <a:endParaRPr/>
           </a:p>
           <a:p>
@@ -19596,7 +19639,19 @@
                 </a:solidFill>
                 <a:latin typeface="Calibri"/>
               </a:rPr>
-              <a:t>Travail de groupe</a:t>
+              <a:t>Création d'un Forum en PHP</a:t>
+            </a:r>
+            <a:endParaRPr/>
+          </a:p>
+          <a:p>
+            <a:r>
+              <a:rPr lang="fr-FR" sz="2400" strike="noStrike">
+                <a:solidFill>
+                  <a:srgbClr val="000000"/>
+                </a:solidFill>
+                <a:latin typeface="Calibri"/>
+              </a:rPr>
+              <a:t>     </a:t>
             </a:r>
             <a:endParaRPr/>
           </a:p>
@@ -19620,6 +19675,33 @@
       </p:sp>
     </p:spTree>
   </p:cSld>
+  <p:timing>
+    <p:tnLst>
+      <p:par>
+        <p:cTn id="3" dur="indefinite" restart="never" nodeType="tmRoot">
+          <p:childTnLst>
+            <p:seq>
+              <p:cTn id="4" nodeType="mainSeq"/>
+              <p:prevCondLst>
+                <p:cond delay="0" evt="onPrev">
+                  <p:tgtEl>
+                    <p:sldTgt/>
+                  </p:tgtEl>
+                </p:cond>
+              </p:prevCondLst>
+              <p:nextCondLst>
+                <p:cond delay="0" evt="onNext">
+                  <p:tgtEl>
+                    <p:sldTgt/>
+                  </p:tgtEl>
+                </p:cond>
+              </p:nextCondLst>
+            </p:seq>
+          </p:childTnLst>
+        </p:cTn>
+      </p:par>
+    </p:tnLst>
+  </p:timing>
 </p:sld>
 </file>
 
@@ -19688,8 +19770,8 @@
         </p:nvSpPr>
         <p:spPr>
           <a:xfrm>
-            <a:off x="457200" y="1654560"/>
-            <a:ext cx="4015800" cy="1896840"/>
+            <a:off x="468000" y="1903320"/>
+            <a:ext cx="8686800" cy="3963240"/>
           </a:xfrm>
           <a:prstGeom prst="rect">
             <a:avLst/>
@@ -19716,7 +19798,7 @@
                 </a:solidFill>
                 <a:latin typeface="Calibri"/>
               </a:rPr>
-              <a:t>Matos</a:t>
+              <a:t>Outils utilisés</a:t>
             </a:r>
             <a:endParaRPr/>
           </a:p>
@@ -19735,7 +19817,7 @@
                 </a:solidFill>
                 <a:latin typeface="Calibri"/>
               </a:rPr>
-              <a:t>BD</a:t>
+              <a:t>Structure de la BDD</a:t>
             </a:r>
             <a:endParaRPr/>
           </a:p>
@@ -19754,7 +19836,7 @@
                 </a:solidFill>
                 <a:latin typeface="Calibri"/>
               </a:rPr>
-              <a:t>MVC</a:t>
+              <a:t>Utilisation du modèle MVC</a:t>
             </a:r>
             <a:endParaRPr/>
           </a:p>
@@ -19773,7 +19855,7 @@
                 </a:solidFill>
                 <a:latin typeface="Calibri"/>
               </a:rPr>
-              <a:t>Archi</a:t>
+              <a:t>Architecture du forum</a:t>
             </a:r>
             <a:endParaRPr/>
           </a:p>
@@ -19792,7 +19874,7 @@
                 </a:solidFill>
                 <a:latin typeface="Calibri"/>
               </a:rPr>
-              <a:t>Des exemples</a:t>
+              <a:t>Présentation des fonctionnalités</a:t>
             </a:r>
             <a:endParaRPr/>
           </a:p>
@@ -19811,7 +19893,7 @@
                 </a:solidFill>
                 <a:latin typeface="Calibri"/>
               </a:rPr>
-              <a:t>Une petite conclu maggle !</a:t>
+              <a:t>Bilan</a:t>
             </a:r>
             <a:endParaRPr/>
           </a:p>
@@ -19829,6 +19911,33 @@
       </p:sp>
     </p:spTree>
   </p:cSld>
+  <p:timing>
+    <p:tnLst>
+      <p:par>
+        <p:cTn id="5" dur="indefinite" restart="never" nodeType="tmRoot">
+          <p:childTnLst>
+            <p:seq>
+              <p:cTn id="6" nodeType="mainSeq"/>
+              <p:prevCondLst>
+                <p:cond delay="0" evt="onPrev">
+                  <p:tgtEl>
+                    <p:sldTgt/>
+                  </p:tgtEl>
+                </p:cond>
+              </p:prevCondLst>
+              <p:nextCondLst>
+                <p:cond delay="0" evt="onNext">
+                  <p:tgtEl>
+                    <p:sldTgt/>
+                  </p:tgtEl>
+                </p:cond>
+              </p:nextCondLst>
+            </p:seq>
+          </p:childTnLst>
+        </p:cTn>
+      </p:par>
+    </p:tnLst>
+  </p:timing>
 </p:sld>
 </file>
 
@@ -20142,6 +20251,33 @@
       </p:pic>
     </p:spTree>
   </p:cSld>
+  <p:timing>
+    <p:tnLst>
+      <p:par>
+        <p:cTn id="7" dur="indefinite" restart="never" nodeType="tmRoot">
+          <p:childTnLst>
+            <p:seq>
+              <p:cTn id="8" nodeType="mainSeq"/>
+              <p:prevCondLst>
+                <p:cond delay="0" evt="onPrev">
+                  <p:tgtEl>
+                    <p:sldTgt/>
+                  </p:tgtEl>
+                </p:cond>
+              </p:prevCondLst>
+              <p:nextCondLst>
+                <p:cond delay="0" evt="onNext">
+                  <p:tgtEl>
+                    <p:sldTgt/>
+                  </p:tgtEl>
+                </p:cond>
+              </p:nextCondLst>
+            </p:seq>
+          </p:childTnLst>
+        </p:cTn>
+      </p:par>
+    </p:tnLst>
+  </p:timing>
 </p:sld>
 </file>
 
@@ -20227,6 +20363,33 @@
       </p:pic>
     </p:spTree>
   </p:cSld>
+  <p:timing>
+    <p:tnLst>
+      <p:par>
+        <p:cTn id="9" dur="indefinite" restart="never" nodeType="tmRoot">
+          <p:childTnLst>
+            <p:seq>
+              <p:cTn id="10" nodeType="mainSeq"/>
+              <p:prevCondLst>
+                <p:cond delay="0" evt="onPrev">
+                  <p:tgtEl>
+                    <p:sldTgt/>
+                  </p:tgtEl>
+                </p:cond>
+              </p:prevCondLst>
+              <p:nextCondLst>
+                <p:cond delay="0" evt="onNext">
+                  <p:tgtEl>
+                    <p:sldTgt/>
+                  </p:tgtEl>
+                </p:cond>
+              </p:nextCondLst>
+            </p:seq>
+          </p:childTnLst>
+        </p:cTn>
+      </p:par>
+    </p:tnLst>
+  </p:timing>
 </p:sld>
 </file>
 
@@ -20296,7 +20459,7 @@
         <p:spPr>
           <a:xfrm>
             <a:off x="1187640" y="4365000"/>
-            <a:ext cx="2016360" cy="646200"/>
+            <a:ext cx="2016360" cy="1189080"/>
           </a:xfrm>
           <a:prstGeom prst="rect">
             <a:avLst/>
@@ -20376,7 +20539,7 @@
         <p:spPr>
           <a:xfrm>
             <a:off x="1835640" y="2205000"/>
-            <a:ext cx="2592360" cy="646200"/>
+            <a:ext cx="2592360" cy="1189080"/>
           </a:xfrm>
           <a:prstGeom prst="rect">
             <a:avLst/>
@@ -20401,7 +20564,7 @@
                 </a:solidFill>
                 <a:latin typeface="Calibri"/>
               </a:rPr>
-              <a:t>Contrôleur</a:t>
+              <a:t>Contrôleurs</a:t>
             </a:r>
             <a:endParaRPr/>
           </a:p>
@@ -20441,7 +20604,7 @@
                 </a:solidFill>
                 <a:latin typeface="Calibri"/>
               </a:rPr>
-              <a:t>Client</a:t>
+              <a:t>Clients</a:t>
             </a:r>
             <a:endParaRPr/>
           </a:p>
@@ -20879,7 +21042,7 @@
         </p:nvSpPr>
         <p:spPr>
           <a:xfrm>
-            <a:off x="4827600" y="5229360"/>
+            <a:off x="5076000" y="5229360"/>
             <a:ext cx="3528360" cy="1224000"/>
           </a:xfrm>
           <a:prstGeom prst="rect">
@@ -20955,6 +21118,33 @@
       </p:sp>
     </p:spTree>
   </p:cSld>
+  <p:timing>
+    <p:tnLst>
+      <p:par>
+        <p:cTn id="11" dur="indefinite" restart="never" nodeType="tmRoot">
+          <p:childTnLst>
+            <p:seq>
+              <p:cTn id="12" nodeType="mainSeq"/>
+              <p:prevCondLst>
+                <p:cond delay="0" evt="onPrev">
+                  <p:tgtEl>
+                    <p:sldTgt/>
+                  </p:tgtEl>
+                </p:cond>
+              </p:prevCondLst>
+              <p:nextCondLst>
+                <p:cond delay="0" evt="onNext">
+                  <p:tgtEl>
+                    <p:sldTgt/>
+                  </p:tgtEl>
+                </p:cond>
+              </p:nextCondLst>
+            </p:seq>
+          </p:childTnLst>
+        </p:cTn>
+      </p:par>
+    </p:tnLst>
+  </p:timing>
 </p:sld>
 </file>
 
@@ -21183,10 +21373,10 @@
   <p:timing>
     <p:tnLst>
       <p:par>
-        <p:cTn id="1" dur="indefinite" restart="never" nodeType="tmRoot">
+        <p:cTn id="13" dur="indefinite" restart="never" nodeType="tmRoot">
           <p:childTnLst>
             <p:seq>
-              <p:cTn id="2" nodeType="mainSeq"/>
+              <p:cTn id="14" nodeType="mainSeq"/>
               <p:prevCondLst>
                 <p:cond delay="0" evt="onPrev">
                   <p:tgtEl>
@@ -21279,7 +21469,7 @@
         </p:blipFill>
         <p:spPr>
           <a:xfrm>
-            <a:off x="1279800" y="1627200"/>
+            <a:off x="1279800" y="1555200"/>
             <a:ext cx="6149880" cy="5188320"/>
           </a:xfrm>
           <a:prstGeom prst="rect">
@@ -21295,10 +21485,10 @@
   <p:timing>
     <p:tnLst>
       <p:par>
-        <p:cTn id="3" dur="indefinite" restart="never" nodeType="tmRoot">
+        <p:cTn id="15" dur="indefinite" restart="never" nodeType="tmRoot">
           <p:childTnLst>
             <p:seq>
-              <p:cTn id="4" nodeType="mainSeq"/>
+              <p:cTn id="16" nodeType="mainSeq"/>
               <p:prevCondLst>
                 <p:cond delay="0" evt="onPrev">
                   <p:tgtEl>
@@ -21456,10 +21646,10 @@
   <p:timing>
     <p:tnLst>
       <p:par>
-        <p:cTn id="5" dur="indefinite" restart="never" nodeType="tmRoot">
+        <p:cTn id="17" dur="indefinite" restart="never" nodeType="tmRoot">
           <p:childTnLst>
             <p:seq>
-              <p:cTn id="6" nodeType="mainSeq"/>
+              <p:cTn id="18" nodeType="mainSeq"/>
               <p:prevCondLst>
                 <p:cond delay="0" evt="onPrev">
                   <p:tgtEl>

</xml_diff>